<commit_message>
adding problem set 1; updating slides
</commit_message>
<xml_diff>
--- a/Slides/1.Terminal&Shell.pptx
+++ b/Slides/1.Terminal&Shell.pptx
@@ -261,8 +261,8 @@
   </pc:docChgLst>
   <pc:docChgLst>
     <pc:chgData name="Stephen Emrich" userId="e6abd74e-3da0-4635-b6e2-0dc330156f74" providerId="ADAL" clId="{E6D15754-9A9E-5308-9947-0AAFEAAF9F3D}"/>
-    <pc:docChg chg="custSel modSld">
-      <pc:chgData name="Stephen Emrich" userId="e6abd74e-3da0-4635-b6e2-0dc330156f74" providerId="ADAL" clId="{E6D15754-9A9E-5308-9947-0AAFEAAF9F3D}" dt="2025-09-04T02:32:47.112" v="68" actId="20577"/>
+    <pc:docChg chg="undo custSel addSld delSld modSld">
+      <pc:chgData name="Stephen Emrich" userId="e6abd74e-3da0-4635-b6e2-0dc330156f74" providerId="ADAL" clId="{E6D15754-9A9E-5308-9947-0AAFEAAF9F3D}" dt="2025-09-04T16:01:03.581" v="293" actId="20577"/>
       <pc:docMkLst>
         <pc:docMk/>
       </pc:docMkLst>
@@ -295,6 +295,58 @@
             <ac:spMk id="3" creationId="{AEAE4C78-CCFA-D3A6-7238-2B8A7C94A134}"/>
           </ac:spMkLst>
         </pc:spChg>
+      </pc:sldChg>
+      <pc:sldChg chg="modSp mod">
+        <pc:chgData name="Stephen Emrich" userId="e6abd74e-3da0-4635-b6e2-0dc330156f74" providerId="ADAL" clId="{E6D15754-9A9E-5308-9947-0AAFEAAF9F3D}" dt="2025-09-04T15:39:00.993" v="152" actId="20577"/>
+        <pc:sldMkLst>
+          <pc:docMk/>
+          <pc:sldMk cId="1017339365" sldId="272"/>
+        </pc:sldMkLst>
+        <pc:spChg chg="mod">
+          <ac:chgData name="Stephen Emrich" userId="e6abd74e-3da0-4635-b6e2-0dc330156f74" providerId="ADAL" clId="{E6D15754-9A9E-5308-9947-0AAFEAAF9F3D}" dt="2025-09-04T15:39:00.993" v="152" actId="20577"/>
+          <ac:spMkLst>
+            <pc:docMk/>
+            <pc:sldMk cId="1017339365" sldId="272"/>
+            <ac:spMk id="3" creationId="{1809EE0E-89FA-55ED-E581-B8F70355CD08}"/>
+          </ac:spMkLst>
+        </pc:spChg>
+      </pc:sldChg>
+      <pc:sldChg chg="modSp mod">
+        <pc:chgData name="Stephen Emrich" userId="e6abd74e-3da0-4635-b6e2-0dc330156f74" providerId="ADAL" clId="{E6D15754-9A9E-5308-9947-0AAFEAAF9F3D}" dt="2025-09-04T15:49:02.593" v="155" actId="20577"/>
+        <pc:sldMkLst>
+          <pc:docMk/>
+          <pc:sldMk cId="1357093507" sldId="292"/>
+        </pc:sldMkLst>
+        <pc:spChg chg="mod">
+          <ac:chgData name="Stephen Emrich" userId="e6abd74e-3da0-4635-b6e2-0dc330156f74" providerId="ADAL" clId="{E6D15754-9A9E-5308-9947-0AAFEAAF9F3D}" dt="2025-09-04T15:49:02.593" v="155" actId="20577"/>
+          <ac:spMkLst>
+            <pc:docMk/>
+            <pc:sldMk cId="1357093507" sldId="292"/>
+            <ac:spMk id="3" creationId="{10371AE6-D33C-633A-5915-9E6CE2255321}"/>
+          </ac:spMkLst>
+        </pc:spChg>
+      </pc:sldChg>
+      <pc:sldChg chg="modSp mod">
+        <pc:chgData name="Stephen Emrich" userId="e6abd74e-3da0-4635-b6e2-0dc330156f74" providerId="ADAL" clId="{E6D15754-9A9E-5308-9947-0AAFEAAF9F3D}" dt="2025-09-04T16:01:03.581" v="293" actId="20577"/>
+        <pc:sldMkLst>
+          <pc:docMk/>
+          <pc:sldMk cId="1313144854" sldId="294"/>
+        </pc:sldMkLst>
+        <pc:spChg chg="mod">
+          <ac:chgData name="Stephen Emrich" userId="e6abd74e-3da0-4635-b6e2-0dc330156f74" providerId="ADAL" clId="{E6D15754-9A9E-5308-9947-0AAFEAAF9F3D}" dt="2025-09-04T16:01:03.581" v="293" actId="20577"/>
+          <ac:spMkLst>
+            <pc:docMk/>
+            <pc:sldMk cId="1313144854" sldId="294"/>
+            <ac:spMk id="3" creationId="{37EC9F5A-541D-646E-6CBD-C3BD6DFE3EA2}"/>
+          </ac:spMkLst>
+        </pc:spChg>
+      </pc:sldChg>
+      <pc:sldChg chg="new del">
+        <pc:chgData name="Stephen Emrich" userId="e6abd74e-3da0-4635-b6e2-0dc330156f74" providerId="ADAL" clId="{E6D15754-9A9E-5308-9947-0AAFEAAF9F3D}" dt="2025-09-04T15:46:20.822" v="154" actId="680"/>
+        <pc:sldMkLst>
+          <pc:docMk/>
+          <pc:sldMk cId="3499962158" sldId="297"/>
+        </pc:sldMkLst>
       </pc:sldChg>
     </pc:docChg>
   </pc:docChgLst>
@@ -8845,7 +8897,7 @@
         <p:spPr/>
         <p:txBody>
           <a:bodyPr>
-            <a:normAutofit fontScale="77500" lnSpcReduction="20000"/>
+            <a:normAutofit fontScale="92500" lnSpcReduction="20000"/>
           </a:bodyPr>
           <a:lstStyle/>
           <a:p>
@@ -8858,11 +8910,11 @@
                 <a:latin typeface="Courier New" panose="02070309020205020404" pitchFamily="49" charset="0"/>
                 <a:cs typeface="Courier New" panose="02070309020205020404" pitchFamily="49" charset="0"/>
               </a:rPr>
-              <a:t>shell-lesson-data/exercise-data/</a:t>
+              <a:t>Lesson 1 Resources </a:t>
             </a:r>
             <a:r>
               <a:rPr lang="en-CA" dirty="0"/>
-              <a:t> directory for this part of the lesson (taken from </a:t>
+              <a:t>directory for this part of the lesson (taken from </a:t>
             </a:r>
             <a:r>
               <a:rPr lang="en-CA" dirty="0">
@@ -8876,32 +8928,15 @@
             </a:r>
           </a:p>
           <a:p>
+            <a:pPr marL="0" indent="0">
+              <a:buNone/>
+            </a:pPr>
             <a:endParaRPr lang="en-CA" dirty="0"/>
           </a:p>
           <a:p>
             <a:r>
               <a:rPr lang="en-CA" dirty="0"/>
-              <a:t>Navigate to the </a:t>
-            </a:r>
-            <a:r>
-              <a:rPr lang="en-CA" dirty="0">
-                <a:latin typeface="Courier New" panose="02070309020205020404" pitchFamily="49" charset="0"/>
-                <a:cs typeface="Courier New" panose="02070309020205020404" pitchFamily="49" charset="0"/>
-              </a:rPr>
-              <a:t>alkanes/</a:t>
-            </a:r>
-            <a:r>
-              <a:rPr lang="en-CA" dirty="0"/>
-              <a:t> directory</a:t>
-            </a:r>
-          </a:p>
-          <a:p>
-            <a:endParaRPr lang="en-CA" dirty="0"/>
-          </a:p>
-          <a:p>
-            <a:r>
-              <a:rPr lang="en-CA" dirty="0"/>
-              <a:t>Type the command :</a:t>
+              <a:t>Download the files and put them in a directory. Then, type the command :</a:t>
             </a:r>
           </a:p>
           <a:p>
@@ -9746,7 +9781,7 @@
                 <a:latin typeface="Courier New" panose="02070309020205020404" pitchFamily="49" charset="0"/>
                 <a:cs typeface="Courier New" panose="02070309020205020404" pitchFamily="49" charset="0"/>
               </a:rPr>
-              <a:t> -l *.</a:t>
+              <a:t> -w *.</a:t>
             </a:r>
             <a:r>
               <a:rPr lang="en-CA" dirty="0" err="1">
@@ -10198,13 +10233,43 @@
             </a:r>
           </a:p>
           <a:p>
+            <a:pPr lvl="1"/>
+            <a:r>
+              <a:rPr lang="en-US" dirty="0"/>
+              <a:t>May need to specify the directory (</a:t>
+            </a:r>
+            <a:r>
+              <a:rPr lang="en-US" dirty="0" err="1"/>
+              <a:t>cwd</a:t>
+            </a:r>
+            <a:r>
+              <a:rPr lang="en-US"/>
+              <a:t> = .)</a:t>
+            </a:r>
             <a:endParaRPr lang="en-US" dirty="0"/>
           </a:p>
           <a:p>
+            <a:endParaRPr lang="en-US" dirty="0"/>
+          </a:p>
+          <a:p>
             <a:r>
               <a:rPr lang="en-US" dirty="0"/>
               <a:t>Try combining wildcards to find files of the same filetype (e.g., .txt)</a:t>
             </a:r>
+          </a:p>
+          <a:p>
+            <a:endParaRPr lang="en-US" dirty="0"/>
+          </a:p>
+          <a:p>
+            <a:r>
+              <a:rPr lang="en-US" dirty="0"/>
+              <a:t>Try it from different levels of </a:t>
+            </a:r>
+            <a:r>
+              <a:rPr lang="en-US" dirty="0" err="1"/>
+              <a:t>diretories</a:t>
+            </a:r>
+            <a:endParaRPr lang="en-US" dirty="0"/>
           </a:p>
           <a:p>
             <a:endParaRPr lang="en-US" dirty="0"/>
@@ -11753,15 +11818,7 @@
           <a:p>
             <a:r>
               <a:rPr lang="en-US" dirty="0"/>
-              <a:t>Should </a:t>
-            </a:r>
-            <a:r>
-              <a:rPr lang="en-US"/>
-              <a:t>also download ‘</a:t>
-            </a:r>
-            <a:r>
-              <a:rPr lang="en-US" dirty="0"/>
-              <a:t>Windows Terminal’</a:t>
+              <a:t>Should also download ‘Windows Terminal’</a:t>
             </a:r>
           </a:p>
         </p:txBody>

</xml_diff>